<commit_message>
- modified: Abschlusspräsentation Final
</commit_message>
<xml_diff>
--- a/documents/projectmanagement/Praesentationen/Abschlusspräsentation_Final.pptx
+++ b/documents/projectmanagement/Praesentationen/Abschlusspräsentation_Final.pptx
@@ -129,7 +129,7 @@
   </p:defaultTextStyle>
   <p:extLst>
     <p:ext uri="{EFAFB233-063F-42B5-8137-9DF3F51BA10A}">
-      <p15:sldGuideLst xmlns:p15="http://schemas.microsoft.com/office/powerpoint/2012/main" xmlns="">
+      <p15:sldGuideLst xmlns:p15="http://schemas.microsoft.com/office/powerpoint/2012/main">
         <p15:guide id="1" orient="horz" pos="2160">
           <p15:clr>
             <a:srgbClr val="A4A3A4"/>
@@ -12862,385 +12862,6 @@
       <dsp:cNvGrpSpPr/>
     </dsp:nvGrpSpPr>
     <dsp:grpSpPr/>
-    <dsp:sp modelId="{D18AE4DD-AA00-4EEF-A915-EA78C3CDDBA5}">
-      <dsp:nvSpPr>
-        <dsp:cNvPr id="0" name=""/>
-        <dsp:cNvSpPr/>
-      </dsp:nvSpPr>
-      <dsp:spPr>
-        <a:xfrm rot="10800000">
-          <a:off x="1693158" y="1946"/>
-          <a:ext cx="5405120" cy="1326872"/>
-        </a:xfrm>
-        <a:prstGeom prst="homePlate">
-          <a:avLst/>
-        </a:prstGeom>
-        <a:solidFill>
-          <a:srgbClr val="009CA2"/>
-        </a:solidFill>
-        <a:ln w="12700" cap="flat" cmpd="sng" algn="ctr">
-          <a:solidFill>
-            <a:schemeClr val="lt1">
-              <a:hueOff val="0"/>
-              <a:satOff val="0"/>
-              <a:lumOff val="0"/>
-              <a:alphaOff val="0"/>
-            </a:schemeClr>
-          </a:solidFill>
-          <a:prstDash val="solid"/>
-          <a:miter lim="800000"/>
-        </a:ln>
-        <a:effectLst/>
-      </dsp:spPr>
-      <dsp:style>
-        <a:lnRef idx="2">
-          <a:scrgbClr r="0" g="0" b="0"/>
-        </a:lnRef>
-        <a:fillRef idx="1">
-          <a:scrgbClr r="0" g="0" b="0"/>
-        </a:fillRef>
-        <a:effectRef idx="0">
-          <a:scrgbClr r="0" g="0" b="0"/>
-        </a:effectRef>
-        <a:fontRef idx="minor">
-          <a:schemeClr val="lt1"/>
-        </a:fontRef>
-      </dsp:style>
-      <dsp:txBody>
-        <a:bodyPr spcFirstLastPara="0" vert="horz" wrap="square" lIns="585114" tIns="125730" rIns="234696" bIns="125730" numCol="1" spcCol="1270" anchor="ctr" anchorCtr="0">
-          <a:noAutofit/>
-        </a:bodyPr>
-        <a:lstStyle/>
-        <a:p>
-          <a:pPr lvl="0" algn="ctr" defTabSz="1466850">
-            <a:lnSpc>
-              <a:spcPct val="90000"/>
-            </a:lnSpc>
-            <a:spcBef>
-              <a:spcPct val="0"/>
-            </a:spcBef>
-            <a:spcAft>
-              <a:spcPct val="35000"/>
-            </a:spcAft>
-          </a:pPr>
-          <a:r>
-            <a:rPr lang="de-DE" sz="3300" kern="1200" dirty="0"/>
-            <a:t>Kontrolle</a:t>
-          </a:r>
-        </a:p>
-      </dsp:txBody>
-      <dsp:txXfrm rot="10800000">
-        <a:off x="2024876" y="1946"/>
-        <a:ext cx="5073402" cy="1326872"/>
-      </dsp:txXfrm>
-    </dsp:sp>
-    <dsp:sp modelId="{B6D2BD4A-D59B-4853-8516-85AF3B582B05}">
-      <dsp:nvSpPr>
-        <dsp:cNvPr id="0" name=""/>
-        <dsp:cNvSpPr/>
-      </dsp:nvSpPr>
-      <dsp:spPr>
-        <a:xfrm>
-          <a:off x="1029721" y="1946"/>
-          <a:ext cx="1326872" cy="1326872"/>
-        </a:xfrm>
-        <a:prstGeom prst="ellipse">
-          <a:avLst/>
-        </a:prstGeom>
-        <a:blipFill>
-          <a:blip xmlns:r="http://schemas.openxmlformats.org/officeDocument/2006/relationships" r:embed="rId1">
-            <a:extLst>
-              <a:ext uri="{28A0092B-C50C-407E-A947-70E740481C1C}">
-                <a14:useLocalDpi xmlns:a14="http://schemas.microsoft.com/office/drawing/2010/main" val="0"/>
-              </a:ext>
-            </a:extLst>
-          </a:blip>
-          <a:srcRect/>
-          <a:stretch>
-            <a:fillRect/>
-          </a:stretch>
-        </a:blipFill>
-        <a:ln w="12700" cap="flat" cmpd="sng" algn="ctr">
-          <a:solidFill>
-            <a:schemeClr val="lt1">
-              <a:hueOff val="0"/>
-              <a:satOff val="0"/>
-              <a:lumOff val="0"/>
-              <a:alphaOff val="0"/>
-            </a:schemeClr>
-          </a:solidFill>
-          <a:prstDash val="solid"/>
-          <a:miter lim="800000"/>
-        </a:ln>
-        <a:effectLst/>
-      </dsp:spPr>
-      <dsp:style>
-        <a:lnRef idx="2">
-          <a:scrgbClr r="0" g="0" b="0"/>
-        </a:lnRef>
-        <a:fillRef idx="1">
-          <a:scrgbClr r="0" g="0" b="0"/>
-        </a:fillRef>
-        <a:effectRef idx="0">
-          <a:scrgbClr r="0" g="0" b="0"/>
-        </a:effectRef>
-        <a:fontRef idx="minor"/>
-      </dsp:style>
-    </dsp:sp>
-    <dsp:sp modelId="{694C880F-B52E-48A7-B8EC-F14ACFBF07DE}">
-      <dsp:nvSpPr>
-        <dsp:cNvPr id="0" name=""/>
-        <dsp:cNvSpPr/>
-      </dsp:nvSpPr>
-      <dsp:spPr>
-        <a:xfrm rot="10800000">
-          <a:off x="1693158" y="1724899"/>
-          <a:ext cx="5405120" cy="1326872"/>
-        </a:xfrm>
-        <a:prstGeom prst="homePlate">
-          <a:avLst/>
-        </a:prstGeom>
-        <a:solidFill>
-          <a:srgbClr val="009CA2"/>
-        </a:solidFill>
-        <a:ln w="12700" cap="flat" cmpd="sng" algn="ctr">
-          <a:solidFill>
-            <a:schemeClr val="lt1">
-              <a:hueOff val="0"/>
-              <a:satOff val="0"/>
-              <a:lumOff val="0"/>
-              <a:alphaOff val="0"/>
-            </a:schemeClr>
-          </a:solidFill>
-          <a:prstDash val="solid"/>
-          <a:miter lim="800000"/>
-        </a:ln>
-        <a:effectLst/>
-      </dsp:spPr>
-      <dsp:style>
-        <a:lnRef idx="2">
-          <a:scrgbClr r="0" g="0" b="0"/>
-        </a:lnRef>
-        <a:fillRef idx="1">
-          <a:scrgbClr r="0" g="0" b="0"/>
-        </a:fillRef>
-        <a:effectRef idx="0">
-          <a:scrgbClr r="0" g="0" b="0"/>
-        </a:effectRef>
-        <a:fontRef idx="minor">
-          <a:schemeClr val="lt1"/>
-        </a:fontRef>
-      </dsp:style>
-      <dsp:txBody>
-        <a:bodyPr spcFirstLastPara="0" vert="horz" wrap="square" lIns="585114" tIns="125730" rIns="234696" bIns="125730" numCol="1" spcCol="1270" anchor="ctr" anchorCtr="0">
-          <a:noAutofit/>
-        </a:bodyPr>
-        <a:lstStyle/>
-        <a:p>
-          <a:pPr lvl="0" algn="ctr" defTabSz="1466850">
-            <a:lnSpc>
-              <a:spcPct val="90000"/>
-            </a:lnSpc>
-            <a:spcBef>
-              <a:spcPct val="0"/>
-            </a:spcBef>
-            <a:spcAft>
-              <a:spcPct val="35000"/>
-            </a:spcAft>
-          </a:pPr>
-          <a:r>
-            <a:rPr lang="de-DE" sz="3300" kern="1200" dirty="0"/>
-            <a:t>Selbstmanagement</a:t>
-          </a:r>
-        </a:p>
-      </dsp:txBody>
-      <dsp:txXfrm rot="10800000">
-        <a:off x="2024876" y="1724899"/>
-        <a:ext cx="5073402" cy="1326872"/>
-      </dsp:txXfrm>
-    </dsp:sp>
-    <dsp:sp modelId="{51B2BDFB-289F-4242-9C5F-B891C0E0CB1B}">
-      <dsp:nvSpPr>
-        <dsp:cNvPr id="0" name=""/>
-        <dsp:cNvSpPr/>
-      </dsp:nvSpPr>
-      <dsp:spPr>
-        <a:xfrm>
-          <a:off x="1029721" y="1724899"/>
-          <a:ext cx="1326872" cy="1326872"/>
-        </a:xfrm>
-        <a:prstGeom prst="ellipse">
-          <a:avLst/>
-        </a:prstGeom>
-        <a:blipFill>
-          <a:blip xmlns:r="http://schemas.openxmlformats.org/officeDocument/2006/relationships" r:embed="rId2">
-            <a:extLst>
-              <a:ext uri="{28A0092B-C50C-407E-A947-70E740481C1C}">
-                <a14:useLocalDpi xmlns:a14="http://schemas.microsoft.com/office/drawing/2010/main" val="0"/>
-              </a:ext>
-            </a:extLst>
-          </a:blip>
-          <a:srcRect/>
-          <a:stretch>
-            <a:fillRect/>
-          </a:stretch>
-        </a:blipFill>
-        <a:ln w="12700" cap="flat" cmpd="sng" algn="ctr">
-          <a:solidFill>
-            <a:schemeClr val="lt1">
-              <a:hueOff val="0"/>
-              <a:satOff val="0"/>
-              <a:lumOff val="0"/>
-              <a:alphaOff val="0"/>
-            </a:schemeClr>
-          </a:solidFill>
-          <a:prstDash val="solid"/>
-          <a:miter lim="800000"/>
-        </a:ln>
-        <a:effectLst/>
-      </dsp:spPr>
-      <dsp:style>
-        <a:lnRef idx="2">
-          <a:scrgbClr r="0" g="0" b="0"/>
-        </a:lnRef>
-        <a:fillRef idx="1">
-          <a:scrgbClr r="0" g="0" b="0"/>
-        </a:fillRef>
-        <a:effectRef idx="0">
-          <a:scrgbClr r="0" g="0" b="0"/>
-        </a:effectRef>
-        <a:fontRef idx="minor"/>
-      </dsp:style>
-    </dsp:sp>
-    <dsp:sp modelId="{04F8EDD3-CC9D-46EE-B46F-412A38AD4846}">
-      <dsp:nvSpPr>
-        <dsp:cNvPr id="0" name=""/>
-        <dsp:cNvSpPr/>
-      </dsp:nvSpPr>
-      <dsp:spPr>
-        <a:xfrm rot="10800000">
-          <a:off x="1693158" y="3447853"/>
-          <a:ext cx="5405120" cy="1326872"/>
-        </a:xfrm>
-        <a:prstGeom prst="homePlate">
-          <a:avLst/>
-        </a:prstGeom>
-        <a:solidFill>
-          <a:srgbClr val="009CA2"/>
-        </a:solidFill>
-        <a:ln w="12700" cap="flat" cmpd="sng" algn="ctr">
-          <a:solidFill>
-            <a:schemeClr val="lt1">
-              <a:hueOff val="0"/>
-              <a:satOff val="0"/>
-              <a:lumOff val="0"/>
-              <a:alphaOff val="0"/>
-            </a:schemeClr>
-          </a:solidFill>
-          <a:prstDash val="solid"/>
-          <a:miter lim="800000"/>
-        </a:ln>
-        <a:effectLst/>
-      </dsp:spPr>
-      <dsp:style>
-        <a:lnRef idx="2">
-          <a:scrgbClr r="0" g="0" b="0"/>
-        </a:lnRef>
-        <a:fillRef idx="1">
-          <a:scrgbClr r="0" g="0" b="0"/>
-        </a:fillRef>
-        <a:effectRef idx="0">
-          <a:scrgbClr r="0" g="0" b="0"/>
-        </a:effectRef>
-        <a:fontRef idx="minor">
-          <a:schemeClr val="lt1"/>
-        </a:fontRef>
-      </dsp:style>
-      <dsp:txBody>
-        <a:bodyPr spcFirstLastPara="0" vert="horz" wrap="square" lIns="585114" tIns="125730" rIns="234696" bIns="125730" numCol="1" spcCol="1270" anchor="ctr" anchorCtr="0">
-          <a:noAutofit/>
-        </a:bodyPr>
-        <a:lstStyle/>
-        <a:p>
-          <a:pPr lvl="0" algn="ctr" defTabSz="1466850">
-            <a:lnSpc>
-              <a:spcPct val="90000"/>
-            </a:lnSpc>
-            <a:spcBef>
-              <a:spcPct val="0"/>
-            </a:spcBef>
-            <a:spcAft>
-              <a:spcPct val="35000"/>
-            </a:spcAft>
-          </a:pPr>
-          <a:r>
-            <a:rPr lang="de-DE" sz="3300" kern="1200" dirty="0" err="1"/>
-            <a:t>Responsive</a:t>
-          </a:r>
-          <a:r>
-            <a:rPr lang="de-DE" sz="3300" kern="1200" dirty="0"/>
-            <a:t> Design</a:t>
-          </a:r>
-        </a:p>
-      </dsp:txBody>
-      <dsp:txXfrm rot="10800000">
-        <a:off x="2024876" y="3447853"/>
-        <a:ext cx="5073402" cy="1326872"/>
-      </dsp:txXfrm>
-    </dsp:sp>
-    <dsp:sp modelId="{C86A4CCF-563E-4578-A1A5-E2CFB4F5F46B}">
-      <dsp:nvSpPr>
-        <dsp:cNvPr id="0" name=""/>
-        <dsp:cNvSpPr/>
-      </dsp:nvSpPr>
-      <dsp:spPr>
-        <a:xfrm>
-          <a:off x="1029721" y="3447853"/>
-          <a:ext cx="1326872" cy="1326872"/>
-        </a:xfrm>
-        <a:prstGeom prst="ellipse">
-          <a:avLst/>
-        </a:prstGeom>
-        <a:blipFill>
-          <a:blip xmlns:r="http://schemas.openxmlformats.org/officeDocument/2006/relationships" r:embed="rId3">
-            <a:extLst>
-              <a:ext uri="{28A0092B-C50C-407E-A947-70E740481C1C}">
-                <a14:useLocalDpi xmlns:a14="http://schemas.microsoft.com/office/drawing/2010/main" val="0"/>
-              </a:ext>
-            </a:extLst>
-          </a:blip>
-          <a:srcRect/>
-          <a:stretch>
-            <a:fillRect/>
-          </a:stretch>
-        </a:blipFill>
-        <a:ln w="12700" cap="flat" cmpd="sng" algn="ctr">
-          <a:solidFill>
-            <a:schemeClr val="lt1">
-              <a:hueOff val="0"/>
-              <a:satOff val="0"/>
-              <a:lumOff val="0"/>
-              <a:alphaOff val="0"/>
-            </a:schemeClr>
-          </a:solidFill>
-          <a:prstDash val="solid"/>
-          <a:miter lim="800000"/>
-        </a:ln>
-        <a:effectLst/>
-      </dsp:spPr>
-      <dsp:style>
-        <a:lnRef idx="2">
-          <a:scrgbClr r="0" g="0" b="0"/>
-        </a:lnRef>
-        <a:fillRef idx="1">
-          <a:scrgbClr r="0" g="0" b="0"/>
-        </a:fillRef>
-        <a:effectRef idx="0">
-          <a:scrgbClr r="0" g="0" b="0"/>
-        </a:effectRef>
-        <a:fontRef idx="minor"/>
-      </dsp:style>
-    </dsp:sp>
   </dsp:spTree>
 </dsp:drawing>
 </file>
@@ -13253,257 +12874,6 @@
       <dsp:cNvGrpSpPr/>
     </dsp:nvGrpSpPr>
     <dsp:grpSpPr/>
-    <dsp:sp modelId="{D18AE4DD-AA00-4EEF-A915-EA78C3CDDBA5}">
-      <dsp:nvSpPr>
-        <dsp:cNvPr id="0" name=""/>
-        <dsp:cNvSpPr/>
-      </dsp:nvSpPr>
-      <dsp:spPr>
-        <a:xfrm rot="10800000">
-          <a:off x="1697811" y="410"/>
-          <a:ext cx="5405120" cy="1345485"/>
-        </a:xfrm>
-        <a:prstGeom prst="homePlate">
-          <a:avLst/>
-        </a:prstGeom>
-        <a:solidFill>
-          <a:srgbClr val="009CA2"/>
-        </a:solidFill>
-        <a:ln w="12700" cap="flat" cmpd="sng" algn="ctr">
-          <a:solidFill>
-            <a:schemeClr val="lt1">
-              <a:hueOff val="0"/>
-              <a:satOff val="0"/>
-              <a:lumOff val="0"/>
-              <a:alphaOff val="0"/>
-            </a:schemeClr>
-          </a:solidFill>
-          <a:prstDash val="solid"/>
-          <a:miter lim="800000"/>
-        </a:ln>
-        <a:effectLst/>
-      </dsp:spPr>
-      <dsp:style>
-        <a:lnRef idx="2">
-          <a:scrgbClr r="0" g="0" b="0"/>
-        </a:lnRef>
-        <a:fillRef idx="1">
-          <a:scrgbClr r="0" g="0" b="0"/>
-        </a:fillRef>
-        <a:effectRef idx="0">
-          <a:scrgbClr r="0" g="0" b="0"/>
-        </a:effectRef>
-        <a:fontRef idx="minor">
-          <a:schemeClr val="lt1"/>
-        </a:fontRef>
-      </dsp:style>
-      <dsp:txBody>
-        <a:bodyPr spcFirstLastPara="0" vert="horz" wrap="square" lIns="593322" tIns="125730" rIns="234696" bIns="125730" numCol="1" spcCol="1270" anchor="ctr" anchorCtr="0">
-          <a:noAutofit/>
-        </a:bodyPr>
-        <a:lstStyle/>
-        <a:p>
-          <a:pPr lvl="0" algn="ctr" defTabSz="1466850">
-            <a:lnSpc>
-              <a:spcPct val="90000"/>
-            </a:lnSpc>
-            <a:spcBef>
-              <a:spcPct val="0"/>
-            </a:spcBef>
-            <a:spcAft>
-              <a:spcPct val="35000"/>
-            </a:spcAft>
-          </a:pPr>
-          <a:r>
-            <a:rPr lang="de-DE" sz="3300" kern="1200" dirty="0"/>
-            <a:t>Informativ</a:t>
-          </a:r>
-        </a:p>
-      </dsp:txBody>
-      <dsp:txXfrm rot="10800000">
-        <a:off x="2034182" y="410"/>
-        <a:ext cx="5068749" cy="1345485"/>
-      </dsp:txXfrm>
-    </dsp:sp>
-    <dsp:sp modelId="{B6D2BD4A-D59B-4853-8516-85AF3B582B05}">
-      <dsp:nvSpPr>
-        <dsp:cNvPr id="0" name=""/>
-        <dsp:cNvSpPr/>
-      </dsp:nvSpPr>
-      <dsp:spPr>
-        <a:xfrm>
-          <a:off x="1025068" y="410"/>
-          <a:ext cx="1345485" cy="1345485"/>
-        </a:xfrm>
-        <a:prstGeom prst="ellipse">
-          <a:avLst/>
-        </a:prstGeom>
-        <a:blipFill>
-          <a:blip xmlns:r="http://schemas.openxmlformats.org/officeDocument/2006/relationships" r:embed="rId1">
-            <a:extLst>
-              <a:ext uri="{28A0092B-C50C-407E-A947-70E740481C1C}">
-                <a14:useLocalDpi xmlns:a14="http://schemas.microsoft.com/office/drawing/2010/main" val="0"/>
-              </a:ext>
-            </a:extLst>
-          </a:blip>
-          <a:srcRect/>
-          <a:stretch>
-            <a:fillRect/>
-          </a:stretch>
-        </a:blipFill>
-        <a:ln w="12700" cap="flat" cmpd="sng" algn="ctr">
-          <a:solidFill>
-            <a:schemeClr val="lt1">
-              <a:hueOff val="0"/>
-              <a:satOff val="0"/>
-              <a:lumOff val="0"/>
-              <a:alphaOff val="0"/>
-            </a:schemeClr>
-          </a:solidFill>
-          <a:prstDash val="solid"/>
-          <a:miter lim="800000"/>
-        </a:ln>
-        <a:effectLst/>
-      </dsp:spPr>
-      <dsp:style>
-        <a:lnRef idx="2">
-          <a:scrgbClr r="0" g="0" b="0"/>
-        </a:lnRef>
-        <a:fillRef idx="1">
-          <a:scrgbClr r="0" g="0" b="0"/>
-        </a:fillRef>
-        <a:effectRef idx="0">
-          <a:scrgbClr r="0" g="0" b="0"/>
-        </a:effectRef>
-        <a:fontRef idx="minor"/>
-      </dsp:style>
-    </dsp:sp>
-    <dsp:sp modelId="{694C880F-B52E-48A7-B8EC-F14ACFBF07DE}">
-      <dsp:nvSpPr>
-        <dsp:cNvPr id="0" name=""/>
-        <dsp:cNvSpPr/>
-      </dsp:nvSpPr>
-      <dsp:spPr>
-        <a:xfrm rot="10800000">
-          <a:off x="1697811" y="1725296"/>
-          <a:ext cx="5405120" cy="1345485"/>
-        </a:xfrm>
-        <a:prstGeom prst="homePlate">
-          <a:avLst/>
-        </a:prstGeom>
-        <a:solidFill>
-          <a:srgbClr val="009CA2"/>
-        </a:solidFill>
-        <a:ln w="12700" cap="flat" cmpd="sng" algn="ctr">
-          <a:solidFill>
-            <a:schemeClr val="lt1">
-              <a:hueOff val="0"/>
-              <a:satOff val="0"/>
-              <a:lumOff val="0"/>
-              <a:alphaOff val="0"/>
-            </a:schemeClr>
-          </a:solidFill>
-          <a:prstDash val="solid"/>
-          <a:miter lim="800000"/>
-        </a:ln>
-        <a:effectLst/>
-      </dsp:spPr>
-      <dsp:style>
-        <a:lnRef idx="2">
-          <a:scrgbClr r="0" g="0" b="0"/>
-        </a:lnRef>
-        <a:fillRef idx="1">
-          <a:scrgbClr r="0" g="0" b="0"/>
-        </a:fillRef>
-        <a:effectRef idx="0">
-          <a:scrgbClr r="0" g="0" b="0"/>
-        </a:effectRef>
-        <a:fontRef idx="minor">
-          <a:schemeClr val="lt1"/>
-        </a:fontRef>
-      </dsp:style>
-      <dsp:txBody>
-        <a:bodyPr spcFirstLastPara="0" vert="horz" wrap="square" lIns="593322" tIns="125730" rIns="234696" bIns="125730" numCol="1" spcCol="1270" anchor="ctr" anchorCtr="0">
-          <a:noAutofit/>
-        </a:bodyPr>
-        <a:lstStyle/>
-        <a:p>
-          <a:pPr lvl="0" algn="ctr" defTabSz="1466850">
-            <a:lnSpc>
-              <a:spcPct val="90000"/>
-            </a:lnSpc>
-            <a:spcBef>
-              <a:spcPct val="0"/>
-            </a:spcBef>
-            <a:spcAft>
-              <a:spcPct val="35000"/>
-            </a:spcAft>
-          </a:pPr>
-          <a:r>
-            <a:rPr lang="de-DE" sz="3300" kern="1200" dirty="0" smtClean="0"/>
-            <a:t>Ortsunabhängig</a:t>
-          </a:r>
-          <a:endParaRPr lang="de-DE" sz="3300" kern="1200" dirty="0"/>
-        </a:p>
-      </dsp:txBody>
-      <dsp:txXfrm rot="10800000">
-        <a:off x="2034182" y="1725296"/>
-        <a:ext cx="5068749" cy="1345485"/>
-      </dsp:txXfrm>
-    </dsp:sp>
-    <dsp:sp modelId="{51B2BDFB-289F-4242-9C5F-B891C0E0CB1B}">
-      <dsp:nvSpPr>
-        <dsp:cNvPr id="0" name=""/>
-        <dsp:cNvSpPr/>
-      </dsp:nvSpPr>
-      <dsp:spPr>
-        <a:xfrm>
-          <a:off x="1025068" y="1725296"/>
-          <a:ext cx="1345485" cy="1345485"/>
-        </a:xfrm>
-        <a:prstGeom prst="ellipse">
-          <a:avLst/>
-        </a:prstGeom>
-        <a:blipFill>
-          <a:blip xmlns:r="http://schemas.openxmlformats.org/officeDocument/2006/relationships" r:embed="rId2">
-            <a:extLst>
-              <a:ext uri="{28A0092B-C50C-407E-A947-70E740481C1C}">
-                <a14:useLocalDpi xmlns:a14="http://schemas.microsoft.com/office/drawing/2010/main" val="0"/>
-              </a:ext>
-            </a:extLst>
-          </a:blip>
-          <a:srcRect/>
-          <a:stretch>
-            <a:fillRect/>
-          </a:stretch>
-        </a:blipFill>
-        <a:ln w="12700" cap="flat" cmpd="sng" algn="ctr">
-          <a:solidFill>
-            <a:schemeClr val="lt1">
-              <a:hueOff val="0"/>
-              <a:satOff val="0"/>
-              <a:lumOff val="0"/>
-              <a:alphaOff val="0"/>
-            </a:schemeClr>
-          </a:solidFill>
-          <a:prstDash val="solid"/>
-          <a:miter lim="800000"/>
-        </a:ln>
-        <a:effectLst/>
-      </dsp:spPr>
-      <dsp:style>
-        <a:lnRef idx="2">
-          <a:scrgbClr r="0" g="0" b="0"/>
-        </a:lnRef>
-        <a:fillRef idx="1">
-          <a:scrgbClr r="0" g="0" b="0"/>
-        </a:fillRef>
-        <a:effectRef idx="0">
-          <a:scrgbClr r="0" g="0" b="0"/>
-        </a:effectRef>
-        <a:fontRef idx="minor"/>
-      </dsp:style>
-    </dsp:sp>
   </dsp:spTree>
 </dsp:drawing>
 </file>
@@ -13516,422 +12886,6 @@
       <dsp:cNvGrpSpPr/>
     </dsp:nvGrpSpPr>
     <dsp:grpSpPr/>
-    <dsp:sp modelId="{40C13C18-9F6E-4C35-AF01-26055ECF05BC}">
-      <dsp:nvSpPr>
-        <dsp:cNvPr id="0" name=""/>
-        <dsp:cNvSpPr/>
-      </dsp:nvSpPr>
-      <dsp:spPr>
-        <a:xfrm>
-          <a:off x="3351994" y="363102"/>
-          <a:ext cx="3811607" cy="1323721"/>
-        </a:xfrm>
-        <a:prstGeom prst="ellipse">
-          <a:avLst/>
-        </a:prstGeom>
-        <a:solidFill>
-          <a:schemeClr val="accent1">
-            <a:tint val="50000"/>
-            <a:alpha val="40000"/>
-            <a:hueOff val="0"/>
-            <a:satOff val="0"/>
-            <a:lumOff val="0"/>
-            <a:alphaOff val="0"/>
-          </a:schemeClr>
-        </a:solidFill>
-        <a:ln>
-          <a:noFill/>
-        </a:ln>
-        <a:effectLst/>
-      </dsp:spPr>
-      <dsp:style>
-        <a:lnRef idx="0">
-          <a:scrgbClr r="0" g="0" b="0"/>
-        </a:lnRef>
-        <a:fillRef idx="1">
-          <a:scrgbClr r="0" g="0" b="0"/>
-        </a:fillRef>
-        <a:effectRef idx="0">
-          <a:scrgbClr r="0" g="0" b="0"/>
-        </a:effectRef>
-        <a:fontRef idx="minor"/>
-      </dsp:style>
-    </dsp:sp>
-    <dsp:sp modelId="{79E6F908-FEEA-4FCD-ADEB-097953564440}">
-      <dsp:nvSpPr>
-        <dsp:cNvPr id="0" name=""/>
-        <dsp:cNvSpPr/>
-      </dsp:nvSpPr>
-      <dsp:spPr>
-        <a:xfrm>
-          <a:off x="4888458" y="3773323"/>
-          <a:ext cx="738683" cy="472757"/>
-        </a:xfrm>
-        <a:prstGeom prst="downArrow">
-          <a:avLst/>
-        </a:prstGeom>
-        <a:solidFill>
-          <a:srgbClr val="009CA2"/>
-        </a:solidFill>
-        <a:ln w="12700" cap="flat" cmpd="sng" algn="ctr">
-          <a:solidFill>
-            <a:schemeClr val="lt1">
-              <a:hueOff val="0"/>
-              <a:satOff val="0"/>
-              <a:lumOff val="0"/>
-              <a:alphaOff val="0"/>
-            </a:schemeClr>
-          </a:solidFill>
-          <a:prstDash val="solid"/>
-          <a:miter lim="800000"/>
-        </a:ln>
-        <a:effectLst/>
-      </dsp:spPr>
-      <dsp:style>
-        <a:lnRef idx="2">
-          <a:scrgbClr r="0" g="0" b="0"/>
-        </a:lnRef>
-        <a:fillRef idx="1">
-          <a:scrgbClr r="0" g="0" b="0"/>
-        </a:fillRef>
-        <a:effectRef idx="0">
-          <a:scrgbClr r="0" g="0" b="0"/>
-        </a:effectRef>
-        <a:fontRef idx="minor"/>
-      </dsp:style>
-    </dsp:sp>
-    <dsp:sp modelId="{E78AFB32-4716-47F2-952A-51413CA0FDD0}">
-      <dsp:nvSpPr>
-        <dsp:cNvPr id="0" name=""/>
-        <dsp:cNvSpPr/>
-      </dsp:nvSpPr>
-      <dsp:spPr>
-        <a:xfrm>
-          <a:off x="3484959" y="3996299"/>
-          <a:ext cx="3545681" cy="886420"/>
-        </a:xfrm>
-        <a:prstGeom prst="rect">
-          <a:avLst/>
-        </a:prstGeom>
-        <a:noFill/>
-        <a:ln>
-          <a:noFill/>
-        </a:ln>
-        <a:effectLst/>
-      </dsp:spPr>
-      <dsp:style>
-        <a:lnRef idx="0">
-          <a:scrgbClr r="0" g="0" b="0"/>
-        </a:lnRef>
-        <a:fillRef idx="0">
-          <a:scrgbClr r="0" g="0" b="0"/>
-        </a:fillRef>
-        <a:effectRef idx="0">
-          <a:scrgbClr r="0" g="0" b="0"/>
-        </a:effectRef>
-        <a:fontRef idx="minor"/>
-      </dsp:style>
-      <dsp:txBody>
-        <a:bodyPr spcFirstLastPara="0" vert="horz" wrap="square" lIns="220472" tIns="220472" rIns="220472" bIns="220472" numCol="1" spcCol="1270" anchor="ctr" anchorCtr="0">
-          <a:noAutofit/>
-        </a:bodyPr>
-        <a:lstStyle/>
-        <a:p>
-          <a:pPr lvl="0" algn="ctr" defTabSz="1377950">
-            <a:lnSpc>
-              <a:spcPct val="90000"/>
-            </a:lnSpc>
-            <a:spcBef>
-              <a:spcPct val="0"/>
-            </a:spcBef>
-            <a:spcAft>
-              <a:spcPct val="35000"/>
-            </a:spcAft>
-          </a:pPr>
-          <a:r>
-            <a:rPr lang="de-DE" sz="3100" kern="1200" dirty="0">
-              <a:solidFill>
-                <a:schemeClr val="tx1"/>
-              </a:solidFill>
-            </a:rPr>
-            <a:t>PAMS</a:t>
-          </a:r>
-        </a:p>
-      </dsp:txBody>
-      <dsp:txXfrm>
-        <a:off x="3484959" y="3996299"/>
-        <a:ext cx="3545681" cy="886420"/>
-      </dsp:txXfrm>
-    </dsp:sp>
-    <dsp:sp modelId="{FB48EB3C-A6B0-4713-B23F-AA21270918BA}">
-      <dsp:nvSpPr>
-        <dsp:cNvPr id="0" name=""/>
-        <dsp:cNvSpPr/>
-      </dsp:nvSpPr>
-      <dsp:spPr>
-        <a:xfrm>
-          <a:off x="4666140" y="1809399"/>
-          <a:ext cx="1564509" cy="1564509"/>
-        </a:xfrm>
-        <a:prstGeom prst="ellipse">
-          <a:avLst/>
-        </a:prstGeom>
-        <a:solidFill>
-          <a:srgbClr val="009CA2"/>
-        </a:solidFill>
-        <a:ln w="12700" cap="flat" cmpd="sng" algn="ctr">
-          <a:solidFill>
-            <a:schemeClr val="lt1">
-              <a:hueOff val="0"/>
-              <a:satOff val="0"/>
-              <a:lumOff val="0"/>
-              <a:alphaOff val="0"/>
-            </a:schemeClr>
-          </a:solidFill>
-          <a:prstDash val="solid"/>
-          <a:miter lim="800000"/>
-        </a:ln>
-        <a:effectLst/>
-      </dsp:spPr>
-      <dsp:style>
-        <a:lnRef idx="2">
-          <a:scrgbClr r="0" g="0" b="0"/>
-        </a:lnRef>
-        <a:fillRef idx="1">
-          <a:scrgbClr r="0" g="0" b="0"/>
-        </a:fillRef>
-        <a:effectRef idx="0">
-          <a:scrgbClr r="0" g="0" b="0"/>
-        </a:effectRef>
-        <a:fontRef idx="minor">
-          <a:schemeClr val="lt1"/>
-        </a:fontRef>
-      </dsp:style>
-      <dsp:txBody>
-        <a:bodyPr spcFirstLastPara="0" vert="horz" wrap="square" lIns="21590" tIns="21590" rIns="21590" bIns="21590" numCol="1" spcCol="1270" anchor="ctr" anchorCtr="0">
-          <a:noAutofit/>
-        </a:bodyPr>
-        <a:lstStyle/>
-        <a:p>
-          <a:pPr lvl="0" algn="ctr" defTabSz="755650">
-            <a:lnSpc>
-              <a:spcPct val="90000"/>
-            </a:lnSpc>
-            <a:spcBef>
-              <a:spcPct val="0"/>
-            </a:spcBef>
-            <a:spcAft>
-              <a:spcPct val="35000"/>
-            </a:spcAft>
-          </a:pPr>
-          <a:r>
-            <a:rPr lang="de-DE" sz="1700" kern="1200" dirty="0"/>
-            <a:t>Flexible Anpassung</a:t>
-          </a:r>
-        </a:p>
-      </dsp:txBody>
-      <dsp:txXfrm>
-        <a:off x="4895257" y="2038516"/>
-        <a:ext cx="1106275" cy="1106275"/>
-      </dsp:txXfrm>
-    </dsp:sp>
-    <dsp:sp modelId="{637E9EA4-BE55-4A56-999F-C6DD8073753E}">
-      <dsp:nvSpPr>
-        <dsp:cNvPr id="0" name=""/>
-        <dsp:cNvSpPr/>
-      </dsp:nvSpPr>
-      <dsp:spPr>
-        <a:xfrm>
-          <a:off x="3600926" y="625679"/>
-          <a:ext cx="1564509" cy="1564509"/>
-        </a:xfrm>
-        <a:prstGeom prst="ellipse">
-          <a:avLst/>
-        </a:prstGeom>
-        <a:solidFill>
-          <a:srgbClr val="009CA2"/>
-        </a:solidFill>
-        <a:ln w="12700" cap="flat" cmpd="sng" algn="ctr">
-          <a:solidFill>
-            <a:schemeClr val="lt1">
-              <a:hueOff val="0"/>
-              <a:satOff val="0"/>
-              <a:lumOff val="0"/>
-              <a:alphaOff val="0"/>
-            </a:schemeClr>
-          </a:solidFill>
-          <a:prstDash val="solid"/>
-          <a:miter lim="800000"/>
-        </a:ln>
-        <a:effectLst/>
-      </dsp:spPr>
-      <dsp:style>
-        <a:lnRef idx="2">
-          <a:scrgbClr r="0" g="0" b="0"/>
-        </a:lnRef>
-        <a:fillRef idx="1">
-          <a:scrgbClr r="0" g="0" b="0"/>
-        </a:fillRef>
-        <a:effectRef idx="0">
-          <a:scrgbClr r="0" g="0" b="0"/>
-        </a:effectRef>
-        <a:fontRef idx="minor">
-          <a:schemeClr val="lt1"/>
-        </a:fontRef>
-      </dsp:style>
-      <dsp:txBody>
-        <a:bodyPr spcFirstLastPara="0" vert="horz" wrap="square" lIns="20320" tIns="20320" rIns="20320" bIns="20320" numCol="1" spcCol="1270" anchor="ctr" anchorCtr="0">
-          <a:noAutofit/>
-        </a:bodyPr>
-        <a:lstStyle/>
-        <a:p>
-          <a:pPr lvl="0" algn="ctr" defTabSz="711200">
-            <a:lnSpc>
-              <a:spcPct val="90000"/>
-            </a:lnSpc>
-            <a:spcBef>
-              <a:spcPct val="0"/>
-            </a:spcBef>
-            <a:spcAft>
-              <a:spcPct val="35000"/>
-            </a:spcAft>
-          </a:pPr>
-          <a:r>
-            <a:rPr lang="de-DE" sz="1600" kern="1200" dirty="0" err="1"/>
-            <a:t>Responsive</a:t>
-          </a:r>
-          <a:r>
-            <a:rPr lang="de-DE" sz="1600" kern="1200" dirty="0"/>
-            <a:t> Design</a:t>
-          </a:r>
-        </a:p>
-      </dsp:txBody>
-      <dsp:txXfrm>
-        <a:off x="3830043" y="854796"/>
-        <a:ext cx="1106275" cy="1106275"/>
-      </dsp:txXfrm>
-    </dsp:sp>
-    <dsp:sp modelId="{48627F83-5CD4-4A3E-A578-EF51E842456F}">
-      <dsp:nvSpPr>
-        <dsp:cNvPr id="0" name=""/>
-        <dsp:cNvSpPr/>
-      </dsp:nvSpPr>
-      <dsp:spPr>
-        <a:xfrm>
-          <a:off x="5280797" y="314549"/>
-          <a:ext cx="1564509" cy="1564509"/>
-        </a:xfrm>
-        <a:prstGeom prst="ellipse">
-          <a:avLst/>
-        </a:prstGeom>
-        <a:solidFill>
-          <a:srgbClr val="009CA2"/>
-        </a:solidFill>
-        <a:ln w="12700" cap="flat" cmpd="sng" algn="ctr">
-          <a:solidFill>
-            <a:schemeClr val="lt1">
-              <a:hueOff val="0"/>
-              <a:satOff val="0"/>
-              <a:lumOff val="0"/>
-              <a:alphaOff val="0"/>
-            </a:schemeClr>
-          </a:solidFill>
-          <a:prstDash val="solid"/>
-          <a:miter lim="800000"/>
-        </a:ln>
-        <a:effectLst/>
-      </dsp:spPr>
-      <dsp:style>
-        <a:lnRef idx="2">
-          <a:scrgbClr r="0" g="0" b="0"/>
-        </a:lnRef>
-        <a:fillRef idx="1">
-          <a:scrgbClr r="0" g="0" b="0"/>
-        </a:fillRef>
-        <a:effectRef idx="0">
-          <a:scrgbClr r="0" g="0" b="0"/>
-        </a:effectRef>
-        <a:fontRef idx="minor">
-          <a:schemeClr val="lt1"/>
-        </a:fontRef>
-      </dsp:style>
-      <dsp:txBody>
-        <a:bodyPr spcFirstLastPara="0" vert="horz" wrap="square" lIns="21590" tIns="21590" rIns="21590" bIns="21590" numCol="1" spcCol="1270" anchor="ctr" anchorCtr="0">
-          <a:noAutofit/>
-        </a:bodyPr>
-        <a:lstStyle/>
-        <a:p>
-          <a:pPr lvl="0" algn="ctr" defTabSz="755650">
-            <a:lnSpc>
-              <a:spcPct val="90000"/>
-            </a:lnSpc>
-            <a:spcBef>
-              <a:spcPct val="0"/>
-            </a:spcBef>
-            <a:spcAft>
-              <a:spcPct val="35000"/>
-            </a:spcAft>
-          </a:pPr>
-          <a:r>
-            <a:rPr lang="de-DE" sz="1700" kern="1200" dirty="0"/>
-            <a:t>Usability</a:t>
-          </a:r>
-        </a:p>
-      </dsp:txBody>
-      <dsp:txXfrm>
-        <a:off x="5509914" y="543666"/>
-        <a:ext cx="1106275" cy="1106275"/>
-      </dsp:txXfrm>
-    </dsp:sp>
-    <dsp:sp modelId="{6A0FE239-3E43-42DC-8A6C-5B40328B4FDA}">
-      <dsp:nvSpPr>
-        <dsp:cNvPr id="0" name=""/>
-        <dsp:cNvSpPr/>
-      </dsp:nvSpPr>
-      <dsp:spPr>
-        <a:xfrm>
-          <a:off x="2960420" y="-155144"/>
-          <a:ext cx="4594759" cy="4048071"/>
-        </a:xfrm>
-        <a:prstGeom prst="funnel">
-          <a:avLst/>
-        </a:prstGeom>
-        <a:solidFill>
-          <a:schemeClr val="lt1">
-            <a:alpha val="40000"/>
-            <a:hueOff val="0"/>
-            <a:satOff val="0"/>
-            <a:lumOff val="0"/>
-            <a:alphaOff val="0"/>
-          </a:schemeClr>
-        </a:solidFill>
-        <a:ln w="6350" cap="flat" cmpd="sng" algn="ctr">
-          <a:solidFill>
-            <a:schemeClr val="accent1">
-              <a:hueOff val="0"/>
-              <a:satOff val="0"/>
-              <a:lumOff val="0"/>
-              <a:alphaOff val="0"/>
-            </a:schemeClr>
-          </a:solidFill>
-          <a:prstDash val="solid"/>
-          <a:miter lim="800000"/>
-        </a:ln>
-        <a:effectLst/>
-      </dsp:spPr>
-      <dsp:style>
-        <a:lnRef idx="1">
-          <a:scrgbClr r="0" g="0" b="0"/>
-        </a:lnRef>
-        <a:fillRef idx="1">
-          <a:scrgbClr r="0" g="0" b="0"/>
-        </a:fillRef>
-        <a:effectRef idx="0">
-          <a:scrgbClr r="0" g="0" b="0"/>
-        </a:effectRef>
-        <a:fontRef idx="minor"/>
-      </dsp:style>
-    </dsp:sp>
   </dsp:spTree>
 </dsp:drawing>
 </file>
@@ -27481,7 +26435,7 @@
           <a:p>
             <a:fld id="{BC5D3495-D642-4B9C-A4D9-ABBA71EA56ED}" type="datetimeFigureOut">
               <a:rPr lang="de-DE" smtClean="0"/>
-              <a:t>08.09.2016</a:t>
+              <a:t>09.09.2016</a:t>
             </a:fld>
             <a:endParaRPr lang="de-DE"/>
           </a:p>
@@ -28456,6 +27410,38 @@
           <a:bodyPr/>
           <a:lstStyle/>
           <a:p>
+            <a:r>
+              <a:rPr lang="de-DE" dirty="0" smtClean="0"/>
+              <a:t>Kümmern uns um Installation,</a:t>
+            </a:r>
+          </a:p>
+          <a:p>
+            <a:r>
+              <a:rPr lang="de-DE" dirty="0" smtClean="0"/>
+              <a:t>Schulen</a:t>
+            </a:r>
+            <a:r>
+              <a:rPr lang="de-DE" baseline="0" dirty="0" smtClean="0"/>
+              <a:t> Ihr Personal und leisten Support bei Problemen.</a:t>
+            </a:r>
+          </a:p>
+          <a:p>
+            <a:r>
+              <a:rPr lang="de-DE" baseline="0" dirty="0" smtClean="0"/>
+              <a:t>Auch Wartung und Service übernehmen unsere qualifizierten Techniker</a:t>
+            </a:r>
+          </a:p>
+          <a:p>
+            <a:r>
+              <a:rPr lang="de-DE" baseline="0" dirty="0" smtClean="0"/>
+              <a:t>Sollten Sie in Erwägung ziehen das Programm weiterzuentwickeln, in welche Richtung auch immer,</a:t>
+            </a:r>
+          </a:p>
+          <a:p>
+            <a:r>
+              <a:rPr lang="de-DE" baseline="0" dirty="0" smtClean="0"/>
+              <a:t>Wir kümmern uns darum.</a:t>
+            </a:r>
             <a:endParaRPr lang="de-DE" dirty="0"/>
           </a:p>
         </p:txBody>
@@ -28542,7 +27528,22 @@
           <a:p>
             <a:r>
               <a:rPr lang="de-DE" dirty="0" smtClean="0"/>
-              <a:t>Freie Wahl, Hilfestellung</a:t>
+              <a:t>Hier</a:t>
+            </a:r>
+            <a:r>
+              <a:rPr lang="de-DE" baseline="0" dirty="0" smtClean="0"/>
+              <a:t> ein Bsp. Wie wir vorgehen könnten.</a:t>
+            </a:r>
+            <a:endParaRPr lang="de-DE" dirty="0" smtClean="0"/>
+          </a:p>
+          <a:p>
+            <a:r>
+              <a:rPr lang="de-DE" dirty="0" smtClean="0"/>
+              <a:t>Freie </a:t>
+            </a:r>
+            <a:r>
+              <a:rPr lang="de-DE" dirty="0" smtClean="0"/>
+              <a:t>Wahl, Hilfestellung</a:t>
             </a:r>
             <a:r>
               <a:rPr lang="de-DE" baseline="0" dirty="0" smtClean="0"/>
@@ -29726,7 +28727,7 @@
           <a:p>
             <a:fld id="{939A55D9-6AB2-4364-AE5A-4B2CFFB043C1}" type="datetimeFigureOut">
               <a:rPr lang="de-DE" smtClean="0"/>
-              <a:t>08.09.2016</a:t>
+              <a:t>09.09.2016</a:t>
             </a:fld>
             <a:endParaRPr lang="de-DE"/>
           </a:p>
@@ -29894,7 +28895,7 @@
           <a:p>
             <a:fld id="{939A55D9-6AB2-4364-AE5A-4B2CFFB043C1}" type="datetimeFigureOut">
               <a:rPr lang="de-DE" smtClean="0"/>
-              <a:t>08.09.2016</a:t>
+              <a:t>09.09.2016</a:t>
             </a:fld>
             <a:endParaRPr lang="de-DE"/>
           </a:p>
@@ -30072,7 +29073,7 @@
           <a:p>
             <a:fld id="{939A55D9-6AB2-4364-AE5A-4B2CFFB043C1}" type="datetimeFigureOut">
               <a:rPr lang="de-DE" smtClean="0"/>
-              <a:t>08.09.2016</a:t>
+              <a:t>09.09.2016</a:t>
             </a:fld>
             <a:endParaRPr lang="de-DE"/>
           </a:p>
@@ -30240,7 +29241,7 @@
           <a:p>
             <a:fld id="{939A55D9-6AB2-4364-AE5A-4B2CFFB043C1}" type="datetimeFigureOut">
               <a:rPr lang="de-DE" smtClean="0"/>
-              <a:t>08.09.2016</a:t>
+              <a:t>09.09.2016</a:t>
             </a:fld>
             <a:endParaRPr lang="de-DE"/>
           </a:p>
@@ -30485,7 +29486,7 @@
           <a:p>
             <a:fld id="{939A55D9-6AB2-4364-AE5A-4B2CFFB043C1}" type="datetimeFigureOut">
               <a:rPr lang="de-DE" smtClean="0"/>
-              <a:t>08.09.2016</a:t>
+              <a:t>09.09.2016</a:t>
             </a:fld>
             <a:endParaRPr lang="de-DE"/>
           </a:p>
@@ -30714,7 +29715,7 @@
           <a:p>
             <a:fld id="{939A55D9-6AB2-4364-AE5A-4B2CFFB043C1}" type="datetimeFigureOut">
               <a:rPr lang="de-DE" smtClean="0"/>
-              <a:t>08.09.2016</a:t>
+              <a:t>09.09.2016</a:t>
             </a:fld>
             <a:endParaRPr lang="de-DE"/>
           </a:p>
@@ -31078,7 +30079,7 @@
           <a:p>
             <a:fld id="{939A55D9-6AB2-4364-AE5A-4B2CFFB043C1}" type="datetimeFigureOut">
               <a:rPr lang="de-DE" smtClean="0"/>
-              <a:t>08.09.2016</a:t>
+              <a:t>09.09.2016</a:t>
             </a:fld>
             <a:endParaRPr lang="de-DE"/>
           </a:p>
@@ -31195,7 +30196,7 @@
           <a:p>
             <a:fld id="{939A55D9-6AB2-4364-AE5A-4B2CFFB043C1}" type="datetimeFigureOut">
               <a:rPr lang="de-DE" smtClean="0"/>
-              <a:t>08.09.2016</a:t>
+              <a:t>09.09.2016</a:t>
             </a:fld>
             <a:endParaRPr lang="de-DE"/>
           </a:p>
@@ -31290,7 +30291,7 @@
           <a:p>
             <a:fld id="{939A55D9-6AB2-4364-AE5A-4B2CFFB043C1}" type="datetimeFigureOut">
               <a:rPr lang="de-DE" smtClean="0"/>
-              <a:t>08.09.2016</a:t>
+              <a:t>09.09.2016</a:t>
             </a:fld>
             <a:endParaRPr lang="de-DE"/>
           </a:p>
@@ -31565,7 +30566,7 @@
           <a:p>
             <a:fld id="{939A55D9-6AB2-4364-AE5A-4B2CFFB043C1}" type="datetimeFigureOut">
               <a:rPr lang="de-DE" smtClean="0"/>
-              <a:t>08.09.2016</a:t>
+              <a:t>09.09.2016</a:t>
             </a:fld>
             <a:endParaRPr lang="de-DE"/>
           </a:p>
@@ -31817,7 +30818,7 @@
           <a:p>
             <a:fld id="{939A55D9-6AB2-4364-AE5A-4B2CFFB043C1}" type="datetimeFigureOut">
               <a:rPr lang="de-DE" smtClean="0"/>
-              <a:t>08.09.2016</a:t>
+              <a:t>09.09.2016</a:t>
             </a:fld>
             <a:endParaRPr lang="de-DE"/>
           </a:p>
@@ -32028,7 +31029,7 @@
           <a:p>
             <a:fld id="{939A55D9-6AB2-4364-AE5A-4B2CFFB043C1}" type="datetimeFigureOut">
               <a:rPr lang="de-DE" smtClean="0"/>
-              <a:t>08.09.2016</a:t>
+              <a:t>09.09.2016</a:t>
             </a:fld>
             <a:endParaRPr lang="de-DE"/>
           </a:p>
@@ -32481,7 +31482,7 @@
           <p:nvPr>
             <p:extLst>
               <p:ext uri="{386F3935-93C4-4BCD-93E2-E3B085C9AB24}">
-                <p16:designElem xmlns="" xmlns:p16="http://schemas.microsoft.com/office/powerpoint/2015/main" val="1"/>
+                <p16:designElem xmlns:p16="http://schemas.microsoft.com/office/powerpoint/2015/main" xmlns="" val="1"/>
               </p:ext>
             </p:extLst>
           </p:nvPr>
@@ -32614,7 +31615,7 @@
           <p:nvPr>
             <p:extLst>
               <p:ext uri="{386F3935-93C4-4BCD-93E2-E3B085C9AB24}">
-                <p16:designElem xmlns="" xmlns:p16="http://schemas.microsoft.com/office/powerpoint/2015/main" val="1"/>
+                <p16:designElem xmlns:p16="http://schemas.microsoft.com/office/powerpoint/2015/main" xmlns="" val="1"/>
               </p:ext>
             </p:extLst>
           </p:nvPr>
@@ -35829,13 +34830,11 @@
           </a:prstGeom>
           <a:solidFill>
             <a:srgbClr val="009CA2">
-              <a:alpha val="67059"/>
+              <a:alpha val="74902"/>
             </a:srgbClr>
           </a:solidFill>
           <a:ln>
-            <a:solidFill>
-              <a:srgbClr val="009CA2"/>
-            </a:solidFill>
+            <a:noFill/>
           </a:ln>
         </p:spPr>
         <p:txBody>
@@ -35876,13 +34875,11 @@
           </a:prstGeom>
           <a:solidFill>
             <a:srgbClr val="009CA2">
-              <a:alpha val="67059"/>
+              <a:alpha val="74902"/>
             </a:srgbClr>
           </a:solidFill>
           <a:ln>
-            <a:solidFill>
-              <a:srgbClr val="009CA2"/>
-            </a:solidFill>
+            <a:noFill/>
           </a:ln>
         </p:spPr>
         <p:txBody>
@@ -35924,13 +34921,11 @@
           </a:prstGeom>
           <a:solidFill>
             <a:srgbClr val="009CA2">
-              <a:alpha val="67059"/>
+              <a:alpha val="74902"/>
             </a:srgbClr>
           </a:solidFill>
           <a:ln>
-            <a:solidFill>
-              <a:srgbClr val="009CA2"/>
-            </a:solidFill>
+            <a:noFill/>
           </a:ln>
         </p:spPr>
         <p:txBody>
@@ -36328,7 +35323,7 @@
 </file>
 
 <file path=ppt/slides/slide7.xml><?xml version="1.0" encoding="utf-8"?>
-<p:sld xmlns:a="http://schemas.openxmlformats.org/drawingml/2006/main" xmlns:r="http://schemas.openxmlformats.org/officeDocument/2006/relationships" xmlns:p="http://schemas.openxmlformats.org/presentationml/2006/main">
+<p:sld xmlns:a="http://schemas.openxmlformats.org/drawingml/2006/main" xmlns:r="http://schemas.openxmlformats.org/officeDocument/2006/relationships" xmlns:p="http://schemas.openxmlformats.org/presentationml/2006/main" show="0">
   <p:cSld>
     <p:spTree>
       <p:nvGrpSpPr>
@@ -36405,6 +35400,14 @@
   <p:clrMapOvr>
     <a:masterClrMapping/>
   </p:clrMapOvr>
+  <mc:AlternateContent xmlns:mc="http://schemas.openxmlformats.org/markup-compatibility/2006">
+    <mc:Choice xmlns:p14="http://schemas.microsoft.com/office/powerpoint/2010/main" Requires="p14">
+      <p:transition spd="slow" p14:dur="2000"/>
+    </mc:Choice>
+    <mc:Fallback>
+      <p:transition spd="slow"/>
+    </mc:Fallback>
+  </mc:AlternateContent>
   <p:timing>
     <p:tnLst>
       <p:par>
@@ -36448,12 +35451,28 @@
           <a:lstStyle/>
           <a:p>
             <a:r>
+              <a:rPr lang="de-DE" dirty="0" smtClean="0">
+                <a:solidFill>
+                  <a:srgbClr val="009CA2"/>
+                </a:solidFill>
+              </a:rPr>
+              <a:t>Ein</a:t>
+            </a:r>
+            <a:r>
+              <a:rPr lang="de-DE" dirty="0" smtClean="0">
+                <a:solidFill>
+                  <a:srgbClr val="009CA2"/>
+                </a:solidFill>
+              </a:rPr>
+              <a:t> </a:t>
+            </a:r>
+            <a:r>
               <a:rPr lang="de-DE" dirty="0">
                 <a:solidFill>
                   <a:srgbClr val="009CA2"/>
                 </a:solidFill>
               </a:rPr>
-              <a:t>1 System </a:t>
+              <a:t>System </a:t>
             </a:r>
             <a:r>
               <a:rPr lang="de-DE" dirty="0"/>
@@ -37126,7 +36145,7 @@
   <a:extraClrSchemeLst/>
   <a:extLst>
     <a:ext uri="{05A4C25C-085E-4340-85A3-A5531E510DB2}">
-      <thm15:themeFamily xmlns:thm15="http://schemas.microsoft.com/office/thememl/2012/main" xmlns="" name="Office Theme" id="{62F939B6-93AF-4DB8-9C6B-D6C7DFDC589F}" vid="{4A3C46E8-61CC-4603-A589-7422A47A8E4A}"/>
+      <thm15:themeFamily xmlns:thm15="http://schemas.microsoft.com/office/thememl/2012/main" name="Office Theme" id="{62F939B6-93AF-4DB8-9C6B-D6C7DFDC589F}" vid="{4A3C46E8-61CC-4603-A589-7422A47A8E4A}"/>
     </a:ext>
   </a:extLst>
 </a:theme>
@@ -37421,7 +36440,7 @@
   <a:extraClrSchemeLst/>
   <a:extLst>
     <a:ext uri="{05A4C25C-085E-4340-85A3-A5531E510DB2}">
-      <thm15:themeFamily xmlns:thm15="http://schemas.microsoft.com/office/thememl/2012/main" xmlns="" name="Office Theme" id="{62F939B6-93AF-4DB8-9C6B-D6C7DFDC589F}" vid="{4A3C46E8-61CC-4603-A589-7422A47A8E4A}"/>
+      <thm15:themeFamily xmlns:thm15="http://schemas.microsoft.com/office/thememl/2012/main" name="Office Theme" id="{62F939B6-93AF-4DB8-9C6B-D6C7DFDC589F}" vid="{4A3C46E8-61CC-4603-A589-7422A47A8E4A}"/>
     </a:ext>
   </a:extLst>
 </a:theme>

</xml_diff>